<commit_message>
no .ppt slide transitions in T&V
</commit_message>
<xml_diff>
--- a/powerpoint/teaching_and_viz/all_content/TandV_Template_2.pptx
+++ b/powerpoint/teaching_and_viz/all_content/TandV_Template_2.pptx
@@ -118,7 +118,7 @@
   </p:defaultTextStyle>
   <p:extLst>
     <p:ext uri="{EFAFB233-063F-42B5-8137-9DF3F51BA10A}">
-      <p15:sldGuideLst xmlns:p15="http://schemas.microsoft.com/office/powerpoint/2012/main">
+      <p15:sldGuideLst xmlns:p15="http://schemas.microsoft.com/office/powerpoint/2012/main" xmlns="">
         <p15:guide id="1" orient="horz" pos="2051">
           <p15:clr>
             <a:srgbClr val="A4A3A4"/>
@@ -147,7 +147,7 @@
       </p15:sldGuideLst>
     </p:ext>
     <p:ext uri="{2D200454-40CA-4A62-9FC3-DE9A4176ACB9}">
-      <p15:notesGuideLst xmlns:p15="http://schemas.microsoft.com/office/powerpoint/2012/main">
+      <p15:notesGuideLst xmlns:p15="http://schemas.microsoft.com/office/powerpoint/2012/main" xmlns="">
         <p15:guide id="1" orient="horz" pos="2880">
           <p15:clr>
             <a:srgbClr val="A4A3A4"/>
@@ -246,7 +246,7 @@
           <a:p>
             <a:fld id="{CD4E326C-6B48-4CC2-8CD0-973122024661}" type="datetimeFigureOut">
               <a:rPr lang="en-US" smtClean="0"/>
-              <a:t>8/11/2014</a:t>
+              <a:t>3/10/16</a:t>
             </a:fld>
             <a:endParaRPr lang="en-US"/>
           </a:p>
@@ -674,8 +674,23 @@
             </a:pPr>
             <a:r>
               <a:rPr lang="en-US" baseline="0" dirty="0" smtClean="0"/>
-              <a:t>This is the easiest way to bring the audience’s focus a particular part of the screen. </a:t>
-            </a:r>
+              <a:t>This is the easiest way to bring the audience’s focus a particular part of the </a:t>
+            </a:r>
+            <a:r>
+              <a:rPr lang="en-US" baseline="0" smtClean="0"/>
+              <a:t>screen.</a:t>
+            </a:r>
+            <a:endParaRPr lang="en-US" baseline="0" dirty="0" smtClean="0"/>
+          </a:p>
+          <a:p>
+            <a:pPr marL="228600" lvl="0" indent="-228600">
+              <a:buAutoNum type="arabicPeriod"/>
+            </a:pPr>
+            <a:r>
+              <a:rPr lang="en-US" baseline="0" dirty="0" smtClean="0"/>
+              <a:t> Slide transitions behave unpredictably and should not be used in presentations for this space. Slide animations, however, are appropriate.</a:t>
+            </a:r>
+            <a:endParaRPr lang="en-US" baseline="0" dirty="0" smtClean="0"/>
           </a:p>
           <a:p>
             <a:pPr marL="685800" lvl="1" indent="-228600">
@@ -1010,7 +1025,7 @@
           <a:p>
             <a:fld id="{1898CCDB-8D64-4B23-BD1F-12413C6C512D}" type="datetimeFigureOut">
               <a:rPr lang="en-US" smtClean="0"/>
-              <a:t>8/11/2014</a:t>
+              <a:t>3/10/16</a:t>
             </a:fld>
             <a:endParaRPr lang="en-US"/>
           </a:p>
@@ -1180,7 +1195,7 @@
           <a:p>
             <a:fld id="{1898CCDB-8D64-4B23-BD1F-12413C6C512D}" type="datetimeFigureOut">
               <a:rPr lang="en-US" smtClean="0"/>
-              <a:t>8/11/2014</a:t>
+              <a:t>3/10/16</a:t>
             </a:fld>
             <a:endParaRPr lang="en-US"/>
           </a:p>
@@ -1360,7 +1375,7 @@
           <a:p>
             <a:fld id="{1898CCDB-8D64-4B23-BD1F-12413C6C512D}" type="datetimeFigureOut">
               <a:rPr lang="en-US" smtClean="0"/>
-              <a:t>8/11/2014</a:t>
+              <a:t>3/10/16</a:t>
             </a:fld>
             <a:endParaRPr lang="en-US"/>
           </a:p>
@@ -1421,7 +1436,7 @@
   <p:timing>
     <p:tnLst>
       <p:par>
-        <p:cTn id="1" dur="indefinite" restart="never" nodeType="tmRoot"/>
+        <p:cTn xmlns:p14="http://schemas.microsoft.com/office/powerpoint/2010/main" id="1" dur="indefinite" restart="never" nodeType="tmRoot"/>
       </p:par>
     </p:tnLst>
   </p:timing>
@@ -1537,7 +1552,7 @@
           <a:p>
             <a:fld id="{1898CCDB-8D64-4B23-BD1F-12413C6C512D}" type="datetimeFigureOut">
               <a:rPr lang="en-US" smtClean="0"/>
-              <a:t>8/11/2014</a:t>
+              <a:t>3/10/16</a:t>
             </a:fld>
             <a:endParaRPr lang="en-US"/>
           </a:p>
@@ -1783,7 +1798,7 @@
           <a:p>
             <a:fld id="{1898CCDB-8D64-4B23-BD1F-12413C6C512D}" type="datetimeFigureOut">
               <a:rPr lang="en-US" smtClean="0"/>
-              <a:t>8/11/2014</a:t>
+              <a:t>3/10/16</a:t>
             </a:fld>
             <a:endParaRPr lang="en-US"/>
           </a:p>
@@ -2071,7 +2086,7 @@
           <a:p>
             <a:fld id="{1898CCDB-8D64-4B23-BD1F-12413C6C512D}" type="datetimeFigureOut">
               <a:rPr lang="en-US" smtClean="0"/>
-              <a:t>8/11/2014</a:t>
+              <a:t>3/10/16</a:t>
             </a:fld>
             <a:endParaRPr lang="en-US"/>
           </a:p>
@@ -2498,7 +2513,7 @@
           <a:p>
             <a:fld id="{1898CCDB-8D64-4B23-BD1F-12413C6C512D}" type="datetimeFigureOut">
               <a:rPr lang="en-US" smtClean="0"/>
-              <a:t>8/11/2014</a:t>
+              <a:t>3/10/16</a:t>
             </a:fld>
             <a:endParaRPr lang="en-US"/>
           </a:p>
@@ -2616,7 +2631,7 @@
           <a:p>
             <a:fld id="{1898CCDB-8D64-4B23-BD1F-12413C6C512D}" type="datetimeFigureOut">
               <a:rPr lang="en-US" smtClean="0"/>
-              <a:t>8/11/2014</a:t>
+              <a:t>3/10/16</a:t>
             </a:fld>
             <a:endParaRPr lang="en-US"/>
           </a:p>
@@ -2711,7 +2726,7 @@
           <a:p>
             <a:fld id="{1898CCDB-8D64-4B23-BD1F-12413C6C512D}" type="datetimeFigureOut">
               <a:rPr lang="en-US" smtClean="0"/>
-              <a:t>8/11/2014</a:t>
+              <a:t>3/10/16</a:t>
             </a:fld>
             <a:endParaRPr lang="en-US"/>
           </a:p>
@@ -2772,7 +2787,7 @@
   <p:timing>
     <p:tnLst>
       <p:par>
-        <p:cTn id="1" dur="indefinite" restart="never" nodeType="tmRoot"/>
+        <p:cTn xmlns:p14="http://schemas.microsoft.com/office/powerpoint/2010/main" id="1" dur="indefinite" restart="never" nodeType="tmRoot"/>
       </p:par>
     </p:tnLst>
   </p:timing>
@@ -2995,7 +3010,7 @@
           <a:p>
             <a:fld id="{1898CCDB-8D64-4B23-BD1F-12413C6C512D}" type="datetimeFigureOut">
               <a:rPr lang="en-US" smtClean="0"/>
-              <a:t>8/11/2014</a:t>
+              <a:t>3/10/16</a:t>
             </a:fld>
             <a:endParaRPr lang="en-US"/>
           </a:p>
@@ -3248,7 +3263,7 @@
           <a:p>
             <a:fld id="{1898CCDB-8D64-4B23-BD1F-12413C6C512D}" type="datetimeFigureOut">
               <a:rPr lang="en-US" smtClean="0"/>
-              <a:t>8/11/2014</a:t>
+              <a:t>3/10/16</a:t>
             </a:fld>
             <a:endParaRPr lang="en-US"/>
           </a:p>
@@ -3461,7 +3476,7 @@
           <a:p>
             <a:fld id="{1898CCDB-8D64-4B23-BD1F-12413C6C512D}" type="datetimeFigureOut">
               <a:rPr lang="en-US" smtClean="0"/>
-              <a:t>8/11/2014</a:t>
+              <a:t>3/10/16</a:t>
             </a:fld>
             <a:endParaRPr lang="en-US"/>
           </a:p>
@@ -4529,7 +4544,7 @@
   <p:timing>
     <p:tnLst>
       <p:par>
-        <p:cTn id="1" dur="indefinite" restart="never" nodeType="tmRoot"/>
+        <p:cTn xmlns:p14="http://schemas.microsoft.com/office/powerpoint/2010/main" id="1" dur="indefinite" restart="never" nodeType="tmRoot"/>
       </p:par>
     </p:tnLst>
   </p:timing>
@@ -4596,7 +4611,7 @@
   <p:timing>
     <p:tnLst>
       <p:par>
-        <p:cTn id="1" dur="indefinite" restart="never" nodeType="tmRoot"/>
+        <p:cTn xmlns:p14="http://schemas.microsoft.com/office/powerpoint/2010/main" id="1" dur="indefinite" restart="never" nodeType="tmRoot"/>
       </p:par>
     </p:tnLst>
   </p:timing>
@@ -4963,7 +4978,7 @@
   <p:timing>
     <p:tnLst>
       <p:par>
-        <p:cTn id="1" dur="indefinite" restart="never" nodeType="tmRoot"/>
+        <p:cTn xmlns:p14="http://schemas.microsoft.com/office/powerpoint/2010/main" id="1" dur="indefinite" restart="never" nodeType="tmRoot"/>
       </p:par>
     </p:tnLst>
   </p:timing>
@@ -5330,7 +5345,7 @@
   <p:timing>
     <p:tnLst>
       <p:par>
-        <p:cTn id="1" dur="indefinite" restart="never" nodeType="tmRoot"/>
+        <p:cTn xmlns:p14="http://schemas.microsoft.com/office/powerpoint/2010/main" id="1" dur="indefinite" restart="never" nodeType="tmRoot"/>
       </p:par>
     </p:tnLst>
   </p:timing>
@@ -5697,7 +5712,7 @@
   <p:timing>
     <p:tnLst>
       <p:par>
-        <p:cTn id="1" dur="indefinite" restart="never" nodeType="tmRoot"/>
+        <p:cTn xmlns:p14="http://schemas.microsoft.com/office/powerpoint/2010/main" id="1" dur="indefinite" restart="never" nodeType="tmRoot"/>
       </p:par>
     </p:tnLst>
   </p:timing>
@@ -6064,7 +6079,7 @@
   <p:timing>
     <p:tnLst>
       <p:par>
-        <p:cTn id="1" dur="indefinite" restart="never" nodeType="tmRoot"/>
+        <p:cTn xmlns:p14="http://schemas.microsoft.com/office/powerpoint/2010/main" id="1" dur="indefinite" restart="never" nodeType="tmRoot"/>
       </p:par>
     </p:tnLst>
   </p:timing>
@@ -6431,7 +6446,7 @@
   <p:timing>
     <p:tnLst>
       <p:par>
-        <p:cTn id="1" dur="indefinite" restart="never" nodeType="tmRoot"/>
+        <p:cTn xmlns:p14="http://schemas.microsoft.com/office/powerpoint/2010/main" id="1" dur="indefinite" restart="never" nodeType="tmRoot"/>
       </p:par>
     </p:tnLst>
   </p:timing>
@@ -6798,7 +6813,7 @@
   <p:timing>
     <p:tnLst>
       <p:par>
-        <p:cTn id="1" dur="indefinite" restart="never" nodeType="tmRoot"/>
+        <p:cTn xmlns:p14="http://schemas.microsoft.com/office/powerpoint/2010/main" id="1" dur="indefinite" restart="never" nodeType="tmRoot"/>
       </p:par>
     </p:tnLst>
   </p:timing>
@@ -7165,7 +7180,7 @@
   <p:timing>
     <p:tnLst>
       <p:par>
-        <p:cTn id="1" dur="indefinite" restart="never" nodeType="tmRoot"/>
+        <p:cTn xmlns:p14="http://schemas.microsoft.com/office/powerpoint/2010/main" id="1" dur="indefinite" restart="never" nodeType="tmRoot"/>
       </p:par>
     </p:tnLst>
   </p:timing>
@@ -7300,7 +7315,7 @@
   <p:timing>
     <p:tnLst>
       <p:par>
-        <p:cTn id="1" dur="indefinite" restart="never" nodeType="tmRoot"/>
+        <p:cTn xmlns:p14="http://schemas.microsoft.com/office/powerpoint/2010/main" id="1" dur="indefinite" restart="never" nodeType="tmRoot"/>
       </p:par>
     </p:tnLst>
   </p:timing>

</xml_diff>